<commit_message>
forgot to save powerpoint before previous commit
</commit_message>
<xml_diff>
--- a/yh_labb/presentation.pptx
+++ b/yh_labb/presentation.pptx
@@ -6,6 +6,12 @@
   </p:sldMasterIdLst>
   <p:sldIdLst>
     <p:sldId id="256" r:id="rId2"/>
+    <p:sldId id="258" r:id="rId3"/>
+    <p:sldId id="261" r:id="rId4"/>
+    <p:sldId id="262" r:id="rId5"/>
+    <p:sldId id="259" r:id="rId6"/>
+    <p:sldId id="260" r:id="rId7"/>
+    <p:sldId id="257" r:id="rId8"/>
   </p:sldIdLst>
   <p:sldSz cx="12192000" cy="6858000"/>
   <p:notesSz cx="6858000" cy="9144000"/>
@@ -3342,60 +3348,1018 @@
           <a:chExt cx="0" cy="0"/>
         </a:xfrm>
       </p:grpSpPr>
-      <p:sp>
-        <p:nvSpPr>
-          <p:cNvPr id="2" name="Title 1">
-            <a:extLst>
-              <a:ext uri="{FF2B5EF4-FFF2-40B4-BE49-F238E27FC236}">
-                <a16:creationId xmlns:a16="http://schemas.microsoft.com/office/drawing/2014/main" id="{86889A2F-E2B8-D909-4285-518841945867}"/>
-              </a:ext>
-            </a:extLst>
-          </p:cNvPr>
-          <p:cNvSpPr>
-            <a:spLocks noGrp="1"/>
-          </p:cNvSpPr>
-          <p:nvPr>
-            <p:ph type="ctrTitle"/>
-          </p:nvPr>
-        </p:nvSpPr>
-        <p:spPr/>
-        <p:txBody>
-          <a:bodyPr/>
-          <a:lstStyle/>
-          <a:p>
-            <a:endParaRPr lang="en-SE"/>
-          </a:p>
-        </p:txBody>
-      </p:sp>
-      <p:sp>
-        <p:nvSpPr>
-          <p:cNvPr id="3" name="Subtitle 2">
-            <a:extLst>
-              <a:ext uri="{FF2B5EF4-FFF2-40B4-BE49-F238E27FC236}">
-                <a16:creationId xmlns:a16="http://schemas.microsoft.com/office/drawing/2014/main" id="{BD5AD298-40B2-CCB7-6866-CCBCE2E65265}"/>
-              </a:ext>
-            </a:extLst>
-          </p:cNvPr>
-          <p:cNvSpPr>
-            <a:spLocks noGrp="1"/>
-          </p:cNvSpPr>
-          <p:nvPr>
-            <p:ph type="subTitle" idx="1"/>
-          </p:nvPr>
-        </p:nvSpPr>
-        <p:spPr/>
-        <p:txBody>
-          <a:bodyPr/>
-          <a:lstStyle/>
-          <a:p>
-            <a:endParaRPr lang="en-SE"/>
-          </a:p>
-        </p:txBody>
-      </p:sp>
+      <p:pic>
+        <p:nvPicPr>
+          <p:cNvPr id="5" name="Picture 4">
+            <a:extLst>
+              <a:ext uri="{FF2B5EF4-FFF2-40B4-BE49-F238E27FC236}">
+                <a16:creationId xmlns:a16="http://schemas.microsoft.com/office/drawing/2014/main" id="{018AE1FC-3C78-1E43-FD7F-675EAC778DD6}"/>
+              </a:ext>
+            </a:extLst>
+          </p:cNvPr>
+          <p:cNvPicPr>
+            <a:picLocks noChangeAspect="1"/>
+          </p:cNvPicPr>
+          <p:nvPr/>
+        </p:nvPicPr>
+        <p:blipFill>
+          <a:blip r:embed="rId2">
+            <a:extLst>
+              <a:ext uri="{28A0092B-C50C-407E-A947-70E740481C1C}">
+                <a14:useLocalDpi xmlns:a14="http://schemas.microsoft.com/office/drawing/2010/main" val="0"/>
+              </a:ext>
+            </a:extLst>
+          </a:blip>
+          <a:stretch>
+            <a:fillRect/>
+          </a:stretch>
+        </p:blipFill>
+        <p:spPr>
+          <a:xfrm>
+            <a:off x="433913" y="139244"/>
+            <a:ext cx="11324174" cy="6579512"/>
+          </a:xfrm>
+          <a:prstGeom prst="rect">
+            <a:avLst/>
+          </a:prstGeom>
+        </p:spPr>
+      </p:pic>
     </p:spTree>
     <p:extLst>
       <p:ext uri="{BB962C8B-B14F-4D97-AF65-F5344CB8AC3E}">
         <p14:creationId xmlns:p14="http://schemas.microsoft.com/office/powerpoint/2010/main" val="805517552"/>
+      </p:ext>
+    </p:extLst>
+  </p:cSld>
+  <p:clrMapOvr>
+    <a:masterClrMapping/>
+  </p:clrMapOvr>
+</p:sld>
+</file>
+
+<file path=ppt/slides/slide2.xml><?xml version="1.0" encoding="utf-8"?>
+<p:sld xmlns:a="http://schemas.openxmlformats.org/drawingml/2006/main" xmlns:r="http://schemas.openxmlformats.org/officeDocument/2006/relationships" xmlns:p="http://schemas.openxmlformats.org/presentationml/2006/main">
+  <p:cSld>
+    <p:spTree>
+      <p:nvGrpSpPr>
+        <p:cNvPr id="1" name="">
+          <a:extLst>
+            <a:ext uri="{FF2B5EF4-FFF2-40B4-BE49-F238E27FC236}">
+              <a16:creationId xmlns:a16="http://schemas.microsoft.com/office/drawing/2014/main" id="{283923CD-AB5E-E5D5-B0A3-09E8D0DB61CA}"/>
+            </a:ext>
+          </a:extLst>
+        </p:cNvPr>
+        <p:cNvGrpSpPr/>
+        <p:nvPr/>
+      </p:nvGrpSpPr>
+      <p:grpSpPr>
+        <a:xfrm>
+          <a:off x="0" y="0"/>
+          <a:ext cx="0" cy="0"/>
+          <a:chOff x="0" y="0"/>
+          <a:chExt cx="0" cy="0"/>
+        </a:xfrm>
+      </p:grpSpPr>
+      <p:pic>
+        <p:nvPicPr>
+          <p:cNvPr id="5" name="Picture 4">
+            <a:extLst>
+              <a:ext uri="{FF2B5EF4-FFF2-40B4-BE49-F238E27FC236}">
+                <a16:creationId xmlns:a16="http://schemas.microsoft.com/office/drawing/2014/main" id="{E6009A33-827E-D560-8DB6-10D693A5B869}"/>
+              </a:ext>
+            </a:extLst>
+          </p:cNvPr>
+          <p:cNvPicPr>
+            <a:picLocks noChangeAspect="1"/>
+          </p:cNvPicPr>
+          <p:nvPr/>
+        </p:nvPicPr>
+        <p:blipFill>
+          <a:blip r:embed="rId2">
+            <a:extLst>
+              <a:ext uri="{28A0092B-C50C-407E-A947-70E740481C1C}">
+                <a14:useLocalDpi xmlns:a14="http://schemas.microsoft.com/office/drawing/2010/main" val="0"/>
+              </a:ext>
+            </a:extLst>
+          </a:blip>
+          <a:stretch>
+            <a:fillRect/>
+          </a:stretch>
+        </p:blipFill>
+        <p:spPr>
+          <a:xfrm>
+            <a:off x="819801" y="363450"/>
+            <a:ext cx="10552398" cy="6131099"/>
+          </a:xfrm>
+          <a:prstGeom prst="rect">
+            <a:avLst/>
+          </a:prstGeom>
+        </p:spPr>
+      </p:pic>
+      <p:sp>
+        <p:nvSpPr>
+          <p:cNvPr id="2" name="L-Shape 1">
+            <a:extLst>
+              <a:ext uri="{FF2B5EF4-FFF2-40B4-BE49-F238E27FC236}">
+                <a16:creationId xmlns:a16="http://schemas.microsoft.com/office/drawing/2014/main" id="{022B0DA5-FCA0-F769-1239-1B02BA9ECA1F}"/>
+              </a:ext>
+            </a:extLst>
+          </p:cNvPr>
+          <p:cNvSpPr/>
+          <p:nvPr/>
+        </p:nvSpPr>
+        <p:spPr>
+          <a:xfrm rot="10800000">
+            <a:off x="6096000" y="162962"/>
+            <a:ext cx="5483382" cy="4517679"/>
+          </a:xfrm>
+          <a:prstGeom prst="corner">
+            <a:avLst>
+              <a:gd name="adj1" fmla="val 29929"/>
+              <a:gd name="adj2" fmla="val 47555"/>
+            </a:avLst>
+          </a:prstGeom>
+          <a:solidFill>
+            <a:srgbClr val="0066FF">
+              <a:alpha val="20000"/>
+            </a:srgbClr>
+          </a:solidFill>
+          <a:ln>
+            <a:noFill/>
+          </a:ln>
+        </p:spPr>
+        <p:style>
+          <a:lnRef idx="2">
+            <a:schemeClr val="accent1">
+              <a:shade val="15000"/>
+            </a:schemeClr>
+          </a:lnRef>
+          <a:fillRef idx="1">
+            <a:schemeClr val="accent1"/>
+          </a:fillRef>
+          <a:effectRef idx="0">
+            <a:schemeClr val="accent1"/>
+          </a:effectRef>
+          <a:fontRef idx="minor">
+            <a:schemeClr val="lt1"/>
+          </a:fontRef>
+        </p:style>
+        <p:txBody>
+          <a:bodyPr rtlCol="0" anchor="ctr"/>
+          <a:lstStyle/>
+          <a:p>
+            <a:pPr algn="ctr"/>
+            <a:endParaRPr lang="en-SE"/>
+          </a:p>
+        </p:txBody>
+      </p:sp>
+      <p:sp>
+        <p:nvSpPr>
+          <p:cNvPr id="3" name="Rectangle 2">
+            <a:extLst>
+              <a:ext uri="{FF2B5EF4-FFF2-40B4-BE49-F238E27FC236}">
+                <a16:creationId xmlns:a16="http://schemas.microsoft.com/office/drawing/2014/main" id="{870F02AF-0C65-E7B0-3792-722F72E0B32E}"/>
+              </a:ext>
+            </a:extLst>
+          </p:cNvPr>
+          <p:cNvSpPr/>
+          <p:nvPr/>
+        </p:nvSpPr>
+        <p:spPr>
+          <a:xfrm>
+            <a:off x="506995" y="162962"/>
+            <a:ext cx="5042780" cy="1358020"/>
+          </a:xfrm>
+          <a:prstGeom prst="rect">
+            <a:avLst/>
+          </a:prstGeom>
+          <a:solidFill>
+            <a:srgbClr val="CC00FF">
+              <a:alpha val="20000"/>
+            </a:srgbClr>
+          </a:solidFill>
+          <a:ln>
+            <a:noFill/>
+          </a:ln>
+        </p:spPr>
+        <p:style>
+          <a:lnRef idx="2">
+            <a:schemeClr val="accent1">
+              <a:shade val="15000"/>
+            </a:schemeClr>
+          </a:lnRef>
+          <a:fillRef idx="1">
+            <a:schemeClr val="accent1"/>
+          </a:fillRef>
+          <a:effectRef idx="0">
+            <a:schemeClr val="accent1"/>
+          </a:effectRef>
+          <a:fontRef idx="minor">
+            <a:schemeClr val="lt1"/>
+          </a:fontRef>
+        </p:style>
+        <p:txBody>
+          <a:bodyPr rtlCol="0" anchor="ctr"/>
+          <a:lstStyle/>
+          <a:p>
+            <a:pPr algn="ctr"/>
+            <a:endParaRPr lang="en-SE"/>
+          </a:p>
+        </p:txBody>
+      </p:sp>
+      <p:sp>
+        <p:nvSpPr>
+          <p:cNvPr id="4" name="Rectangle 3">
+            <a:extLst>
+              <a:ext uri="{FF2B5EF4-FFF2-40B4-BE49-F238E27FC236}">
+                <a16:creationId xmlns:a16="http://schemas.microsoft.com/office/drawing/2014/main" id="{BE702F69-04B4-368C-798F-6A297C18C45D}"/>
+              </a:ext>
+            </a:extLst>
+          </p:cNvPr>
+          <p:cNvSpPr/>
+          <p:nvPr/>
+        </p:nvSpPr>
+        <p:spPr>
+          <a:xfrm>
+            <a:off x="3023857" y="1742792"/>
+            <a:ext cx="2525918" cy="1358019"/>
+          </a:xfrm>
+          <a:prstGeom prst="rect">
+            <a:avLst/>
+          </a:prstGeom>
+          <a:solidFill>
+            <a:srgbClr val="FFFF00">
+              <a:alpha val="20000"/>
+            </a:srgbClr>
+          </a:solidFill>
+          <a:ln>
+            <a:noFill/>
+          </a:ln>
+        </p:spPr>
+        <p:style>
+          <a:lnRef idx="2">
+            <a:schemeClr val="accent1">
+              <a:shade val="15000"/>
+            </a:schemeClr>
+          </a:lnRef>
+          <a:fillRef idx="1">
+            <a:schemeClr val="accent1"/>
+          </a:fillRef>
+          <a:effectRef idx="0">
+            <a:schemeClr val="accent1"/>
+          </a:effectRef>
+          <a:fontRef idx="minor">
+            <a:schemeClr val="lt1"/>
+          </a:fontRef>
+        </p:style>
+        <p:txBody>
+          <a:bodyPr rtlCol="0" anchor="ctr"/>
+          <a:lstStyle/>
+          <a:p>
+            <a:pPr algn="ctr"/>
+            <a:endParaRPr lang="en-SE"/>
+          </a:p>
+        </p:txBody>
+      </p:sp>
+      <p:sp>
+        <p:nvSpPr>
+          <p:cNvPr id="11" name="Rectangle 10">
+            <a:extLst>
+              <a:ext uri="{FF2B5EF4-FFF2-40B4-BE49-F238E27FC236}">
+                <a16:creationId xmlns:a16="http://schemas.microsoft.com/office/drawing/2014/main" id="{B0A32505-1454-6498-9F11-4E88A2DBEECB}"/>
+              </a:ext>
+            </a:extLst>
+          </p:cNvPr>
+          <p:cNvSpPr/>
+          <p:nvPr/>
+        </p:nvSpPr>
+        <p:spPr>
+          <a:xfrm>
+            <a:off x="6174463" y="1742791"/>
+            <a:ext cx="2417276" cy="2648139"/>
+          </a:xfrm>
+          <a:prstGeom prst="rect">
+            <a:avLst/>
+          </a:prstGeom>
+          <a:solidFill>
+            <a:srgbClr val="92D050">
+              <a:alpha val="20000"/>
+            </a:srgbClr>
+          </a:solidFill>
+          <a:ln>
+            <a:noFill/>
+          </a:ln>
+        </p:spPr>
+        <p:style>
+          <a:lnRef idx="2">
+            <a:schemeClr val="accent1">
+              <a:shade val="15000"/>
+            </a:schemeClr>
+          </a:lnRef>
+          <a:fillRef idx="1">
+            <a:schemeClr val="accent1"/>
+          </a:fillRef>
+          <a:effectRef idx="0">
+            <a:schemeClr val="accent1"/>
+          </a:effectRef>
+          <a:fontRef idx="minor">
+            <a:schemeClr val="lt1"/>
+          </a:fontRef>
+        </p:style>
+        <p:txBody>
+          <a:bodyPr rtlCol="0" anchor="ctr"/>
+          <a:lstStyle/>
+          <a:p>
+            <a:pPr algn="ctr"/>
+            <a:endParaRPr lang="en-SE"/>
+          </a:p>
+        </p:txBody>
+      </p:sp>
+      <p:sp>
+        <p:nvSpPr>
+          <p:cNvPr id="12" name="Rectangle 11">
+            <a:extLst>
+              <a:ext uri="{FF2B5EF4-FFF2-40B4-BE49-F238E27FC236}">
+                <a16:creationId xmlns:a16="http://schemas.microsoft.com/office/drawing/2014/main" id="{1BC504B3-409C-94B3-A24D-AFF92128A1B5}"/>
+              </a:ext>
+            </a:extLst>
+          </p:cNvPr>
+          <p:cNvSpPr/>
+          <p:nvPr/>
+        </p:nvSpPr>
+        <p:spPr>
+          <a:xfrm>
+            <a:off x="5305331" y="4390931"/>
+            <a:ext cx="4191754" cy="1330860"/>
+          </a:xfrm>
+          <a:prstGeom prst="rect">
+            <a:avLst/>
+          </a:prstGeom>
+          <a:solidFill>
+            <a:srgbClr val="92D050">
+              <a:alpha val="20000"/>
+            </a:srgbClr>
+          </a:solidFill>
+          <a:ln>
+            <a:noFill/>
+          </a:ln>
+        </p:spPr>
+        <p:style>
+          <a:lnRef idx="2">
+            <a:schemeClr val="accent1">
+              <a:shade val="15000"/>
+            </a:schemeClr>
+          </a:lnRef>
+          <a:fillRef idx="1">
+            <a:schemeClr val="accent1"/>
+          </a:fillRef>
+          <a:effectRef idx="0">
+            <a:schemeClr val="accent1"/>
+          </a:effectRef>
+          <a:fontRef idx="minor">
+            <a:schemeClr val="lt1"/>
+          </a:fontRef>
+        </p:style>
+        <p:txBody>
+          <a:bodyPr rtlCol="0" anchor="ctr"/>
+          <a:lstStyle/>
+          <a:p>
+            <a:pPr algn="ctr"/>
+            <a:endParaRPr lang="en-SE"/>
+          </a:p>
+        </p:txBody>
+      </p:sp>
+    </p:spTree>
+    <p:extLst>
+      <p:ext uri="{BB962C8B-B14F-4D97-AF65-F5344CB8AC3E}">
+        <p14:creationId xmlns:p14="http://schemas.microsoft.com/office/powerpoint/2010/main" val="1610387243"/>
+      </p:ext>
+    </p:extLst>
+  </p:cSld>
+  <p:clrMapOvr>
+    <a:masterClrMapping/>
+  </p:clrMapOvr>
+</p:sld>
+</file>
+
+<file path=ppt/slides/slide3.xml><?xml version="1.0" encoding="utf-8"?>
+<p:sld xmlns:a="http://schemas.openxmlformats.org/drawingml/2006/main" xmlns:r="http://schemas.openxmlformats.org/officeDocument/2006/relationships" xmlns:p="http://schemas.openxmlformats.org/presentationml/2006/main">
+  <p:cSld>
+    <p:spTree>
+      <p:nvGrpSpPr>
+        <p:cNvPr id="1" name="">
+          <a:extLst>
+            <a:ext uri="{FF2B5EF4-FFF2-40B4-BE49-F238E27FC236}">
+              <a16:creationId xmlns:a16="http://schemas.microsoft.com/office/drawing/2014/main" id="{C2B90745-7454-905C-4BE8-12CAA09DDEFC}"/>
+            </a:ext>
+          </a:extLst>
+        </p:cNvPr>
+        <p:cNvGrpSpPr/>
+        <p:nvPr/>
+      </p:nvGrpSpPr>
+      <p:grpSpPr>
+        <a:xfrm>
+          <a:off x="0" y="0"/>
+          <a:ext cx="0" cy="0"/>
+          <a:chOff x="0" y="0"/>
+          <a:chExt cx="0" cy="0"/>
+        </a:xfrm>
+      </p:grpSpPr>
+      <p:pic>
+        <p:nvPicPr>
+          <p:cNvPr id="5" name="Picture 4">
+            <a:extLst>
+              <a:ext uri="{FF2B5EF4-FFF2-40B4-BE49-F238E27FC236}">
+                <a16:creationId xmlns:a16="http://schemas.microsoft.com/office/drawing/2014/main" id="{531CBFBD-852A-0753-F128-A572FEA736CD}"/>
+              </a:ext>
+            </a:extLst>
+          </p:cNvPr>
+          <p:cNvPicPr>
+            <a:picLocks noChangeAspect="1"/>
+          </p:cNvPicPr>
+          <p:nvPr/>
+        </p:nvPicPr>
+        <p:blipFill>
+          <a:blip r:embed="rId2">
+            <a:extLst>
+              <a:ext uri="{28A0092B-C50C-407E-A947-70E740481C1C}">
+                <a14:useLocalDpi xmlns:a14="http://schemas.microsoft.com/office/drawing/2010/main" val="0"/>
+              </a:ext>
+            </a:extLst>
+          </a:blip>
+          <a:stretch>
+            <a:fillRect/>
+          </a:stretch>
+        </p:blipFill>
+        <p:spPr>
+          <a:xfrm>
+            <a:off x="819801" y="363450"/>
+            <a:ext cx="10552398" cy="6131099"/>
+          </a:xfrm>
+          <a:prstGeom prst="rect">
+            <a:avLst/>
+          </a:prstGeom>
+        </p:spPr>
+      </p:pic>
+      <p:sp>
+        <p:nvSpPr>
+          <p:cNvPr id="3" name="Rectangle 2">
+            <a:extLst>
+              <a:ext uri="{FF2B5EF4-FFF2-40B4-BE49-F238E27FC236}">
+                <a16:creationId xmlns:a16="http://schemas.microsoft.com/office/drawing/2014/main" id="{E50E30B5-3D6A-DC22-9A1D-72590799BEC2}"/>
+              </a:ext>
+            </a:extLst>
+          </p:cNvPr>
+          <p:cNvSpPr/>
+          <p:nvPr/>
+        </p:nvSpPr>
+        <p:spPr>
+          <a:xfrm>
+            <a:off x="506995" y="162962"/>
+            <a:ext cx="5042780" cy="1358020"/>
+          </a:xfrm>
+          <a:prstGeom prst="rect">
+            <a:avLst/>
+          </a:prstGeom>
+          <a:solidFill>
+            <a:srgbClr val="CC00FF">
+              <a:alpha val="20000"/>
+            </a:srgbClr>
+          </a:solidFill>
+          <a:ln>
+            <a:noFill/>
+          </a:ln>
+        </p:spPr>
+        <p:style>
+          <a:lnRef idx="2">
+            <a:schemeClr val="accent1">
+              <a:shade val="15000"/>
+            </a:schemeClr>
+          </a:lnRef>
+          <a:fillRef idx="1">
+            <a:schemeClr val="accent1"/>
+          </a:fillRef>
+          <a:effectRef idx="0">
+            <a:schemeClr val="accent1"/>
+          </a:effectRef>
+          <a:fontRef idx="minor">
+            <a:schemeClr val="lt1"/>
+          </a:fontRef>
+        </p:style>
+        <p:txBody>
+          <a:bodyPr rtlCol="0" anchor="ctr"/>
+          <a:lstStyle/>
+          <a:p>
+            <a:pPr algn="ctr"/>
+            <a:endParaRPr lang="en-SE"/>
+          </a:p>
+        </p:txBody>
+      </p:sp>
+    </p:spTree>
+    <p:extLst>
+      <p:ext uri="{BB962C8B-B14F-4D97-AF65-F5344CB8AC3E}">
+        <p14:creationId xmlns:p14="http://schemas.microsoft.com/office/powerpoint/2010/main" val="1840466727"/>
+      </p:ext>
+    </p:extLst>
+  </p:cSld>
+  <p:clrMapOvr>
+    <a:masterClrMapping/>
+  </p:clrMapOvr>
+</p:sld>
+</file>
+
+<file path=ppt/slides/slide4.xml><?xml version="1.0" encoding="utf-8"?>
+<p:sld xmlns:a="http://schemas.openxmlformats.org/drawingml/2006/main" xmlns:r="http://schemas.openxmlformats.org/officeDocument/2006/relationships" xmlns:p="http://schemas.openxmlformats.org/presentationml/2006/main">
+  <p:cSld>
+    <p:spTree>
+      <p:nvGrpSpPr>
+        <p:cNvPr id="1" name="">
+          <a:extLst>
+            <a:ext uri="{FF2B5EF4-FFF2-40B4-BE49-F238E27FC236}">
+              <a16:creationId xmlns:a16="http://schemas.microsoft.com/office/drawing/2014/main" id="{D178644B-F9FD-0BD2-935D-DD65FAA158E6}"/>
+            </a:ext>
+          </a:extLst>
+        </p:cNvPr>
+        <p:cNvGrpSpPr/>
+        <p:nvPr/>
+      </p:nvGrpSpPr>
+      <p:grpSpPr>
+        <a:xfrm>
+          <a:off x="0" y="0"/>
+          <a:ext cx="0" cy="0"/>
+          <a:chOff x="0" y="0"/>
+          <a:chExt cx="0" cy="0"/>
+        </a:xfrm>
+      </p:grpSpPr>
+      <p:pic>
+        <p:nvPicPr>
+          <p:cNvPr id="5" name="Picture 4">
+            <a:extLst>
+              <a:ext uri="{FF2B5EF4-FFF2-40B4-BE49-F238E27FC236}">
+                <a16:creationId xmlns:a16="http://schemas.microsoft.com/office/drawing/2014/main" id="{9B11C4F8-8754-6087-6226-A36007B4BAB4}"/>
+              </a:ext>
+            </a:extLst>
+          </p:cNvPr>
+          <p:cNvPicPr>
+            <a:picLocks noChangeAspect="1"/>
+          </p:cNvPicPr>
+          <p:nvPr/>
+        </p:nvPicPr>
+        <p:blipFill>
+          <a:blip r:embed="rId2">
+            <a:extLst>
+              <a:ext uri="{28A0092B-C50C-407E-A947-70E740481C1C}">
+                <a14:useLocalDpi xmlns:a14="http://schemas.microsoft.com/office/drawing/2010/main" val="0"/>
+              </a:ext>
+            </a:extLst>
+          </a:blip>
+          <a:stretch>
+            <a:fillRect/>
+          </a:stretch>
+        </p:blipFill>
+        <p:spPr>
+          <a:xfrm>
+            <a:off x="819801" y="363450"/>
+            <a:ext cx="10552398" cy="6131099"/>
+          </a:xfrm>
+          <a:prstGeom prst="rect">
+            <a:avLst/>
+          </a:prstGeom>
+        </p:spPr>
+      </p:pic>
+      <p:sp>
+        <p:nvSpPr>
+          <p:cNvPr id="2" name="L-Shape 1">
+            <a:extLst>
+              <a:ext uri="{FF2B5EF4-FFF2-40B4-BE49-F238E27FC236}">
+                <a16:creationId xmlns:a16="http://schemas.microsoft.com/office/drawing/2014/main" id="{2324BD5E-CEAE-1635-CC63-204227E2C4A8}"/>
+              </a:ext>
+            </a:extLst>
+          </p:cNvPr>
+          <p:cNvSpPr/>
+          <p:nvPr/>
+        </p:nvSpPr>
+        <p:spPr>
+          <a:xfrm rot="10800000">
+            <a:off x="6096000" y="162962"/>
+            <a:ext cx="5483382" cy="4517679"/>
+          </a:xfrm>
+          <a:prstGeom prst="corner">
+            <a:avLst>
+              <a:gd name="adj1" fmla="val 29929"/>
+              <a:gd name="adj2" fmla="val 47555"/>
+            </a:avLst>
+          </a:prstGeom>
+          <a:solidFill>
+            <a:srgbClr val="0066FF">
+              <a:alpha val="20000"/>
+            </a:srgbClr>
+          </a:solidFill>
+          <a:ln>
+            <a:noFill/>
+          </a:ln>
+        </p:spPr>
+        <p:style>
+          <a:lnRef idx="2">
+            <a:schemeClr val="accent1">
+              <a:shade val="15000"/>
+            </a:schemeClr>
+          </a:lnRef>
+          <a:fillRef idx="1">
+            <a:schemeClr val="accent1"/>
+          </a:fillRef>
+          <a:effectRef idx="0">
+            <a:schemeClr val="accent1"/>
+          </a:effectRef>
+          <a:fontRef idx="minor">
+            <a:schemeClr val="lt1"/>
+          </a:fontRef>
+        </p:style>
+        <p:txBody>
+          <a:bodyPr rtlCol="0" anchor="ctr"/>
+          <a:lstStyle/>
+          <a:p>
+            <a:pPr algn="ctr"/>
+            <a:endParaRPr lang="en-SE"/>
+          </a:p>
+        </p:txBody>
+      </p:sp>
+    </p:spTree>
+    <p:extLst>
+      <p:ext uri="{BB962C8B-B14F-4D97-AF65-F5344CB8AC3E}">
+        <p14:creationId xmlns:p14="http://schemas.microsoft.com/office/powerpoint/2010/main" val="4193703821"/>
+      </p:ext>
+    </p:extLst>
+  </p:cSld>
+  <p:clrMapOvr>
+    <a:masterClrMapping/>
+  </p:clrMapOvr>
+</p:sld>
+</file>
+
+<file path=ppt/slides/slide5.xml><?xml version="1.0" encoding="utf-8"?>
+<p:sld xmlns:a="http://schemas.openxmlformats.org/drawingml/2006/main" xmlns:r="http://schemas.openxmlformats.org/officeDocument/2006/relationships" xmlns:p="http://schemas.openxmlformats.org/presentationml/2006/main">
+  <p:cSld>
+    <p:spTree>
+      <p:nvGrpSpPr>
+        <p:cNvPr id="1" name="">
+          <a:extLst>
+            <a:ext uri="{FF2B5EF4-FFF2-40B4-BE49-F238E27FC236}">
+              <a16:creationId xmlns:a16="http://schemas.microsoft.com/office/drawing/2014/main" id="{0D5BD6D7-3485-D0C2-8B99-2B0A3DF49E6A}"/>
+            </a:ext>
+          </a:extLst>
+        </p:cNvPr>
+        <p:cNvGrpSpPr/>
+        <p:nvPr/>
+      </p:nvGrpSpPr>
+      <p:grpSpPr>
+        <a:xfrm>
+          <a:off x="0" y="0"/>
+          <a:ext cx="0" cy="0"/>
+          <a:chOff x="0" y="0"/>
+          <a:chExt cx="0" cy="0"/>
+        </a:xfrm>
+      </p:grpSpPr>
+      <p:pic>
+        <p:nvPicPr>
+          <p:cNvPr id="5" name="Picture 4">
+            <a:extLst>
+              <a:ext uri="{FF2B5EF4-FFF2-40B4-BE49-F238E27FC236}">
+                <a16:creationId xmlns:a16="http://schemas.microsoft.com/office/drawing/2014/main" id="{4AA0C99D-A3CB-47BE-4DCC-CF38CDD9B4D5}"/>
+              </a:ext>
+            </a:extLst>
+          </p:cNvPr>
+          <p:cNvPicPr>
+            <a:picLocks noChangeAspect="1"/>
+          </p:cNvPicPr>
+          <p:nvPr/>
+        </p:nvPicPr>
+        <p:blipFill>
+          <a:blip r:embed="rId2">
+            <a:extLst>
+              <a:ext uri="{28A0092B-C50C-407E-A947-70E740481C1C}">
+                <a14:useLocalDpi xmlns:a14="http://schemas.microsoft.com/office/drawing/2010/main" val="0"/>
+              </a:ext>
+            </a:extLst>
+          </a:blip>
+          <a:stretch>
+            <a:fillRect/>
+          </a:stretch>
+        </p:blipFill>
+        <p:spPr>
+          <a:xfrm>
+            <a:off x="819801" y="363450"/>
+            <a:ext cx="10552398" cy="6131099"/>
+          </a:xfrm>
+          <a:prstGeom prst="rect">
+            <a:avLst/>
+          </a:prstGeom>
+        </p:spPr>
+      </p:pic>
+      <p:sp>
+        <p:nvSpPr>
+          <p:cNvPr id="9" name="Rectangle 8">
+            <a:extLst>
+              <a:ext uri="{FF2B5EF4-FFF2-40B4-BE49-F238E27FC236}">
+                <a16:creationId xmlns:a16="http://schemas.microsoft.com/office/drawing/2014/main" id="{1B40EB97-2036-79F0-404C-3F399F0BCC51}"/>
+              </a:ext>
+            </a:extLst>
+          </p:cNvPr>
+          <p:cNvSpPr/>
+          <p:nvPr/>
+        </p:nvSpPr>
+        <p:spPr>
+          <a:xfrm>
+            <a:off x="5305331" y="4390931"/>
+            <a:ext cx="4191754" cy="1330860"/>
+          </a:xfrm>
+          <a:prstGeom prst="rect">
+            <a:avLst/>
+          </a:prstGeom>
+          <a:solidFill>
+            <a:srgbClr val="92D050">
+              <a:alpha val="20000"/>
+            </a:srgbClr>
+          </a:solidFill>
+          <a:ln>
+            <a:noFill/>
+          </a:ln>
+        </p:spPr>
+        <p:style>
+          <a:lnRef idx="2">
+            <a:schemeClr val="accent1">
+              <a:shade val="15000"/>
+            </a:schemeClr>
+          </a:lnRef>
+          <a:fillRef idx="1">
+            <a:schemeClr val="accent1"/>
+          </a:fillRef>
+          <a:effectRef idx="0">
+            <a:schemeClr val="accent1"/>
+          </a:effectRef>
+          <a:fontRef idx="minor">
+            <a:schemeClr val="lt1"/>
+          </a:fontRef>
+        </p:style>
+        <p:txBody>
+          <a:bodyPr rtlCol="0" anchor="ctr"/>
+          <a:lstStyle/>
+          <a:p>
+            <a:pPr algn="ctr"/>
+            <a:endParaRPr lang="en-SE"/>
+          </a:p>
+        </p:txBody>
+      </p:sp>
+      <p:sp>
+        <p:nvSpPr>
+          <p:cNvPr id="10" name="Rectangle 9">
+            <a:extLst>
+              <a:ext uri="{FF2B5EF4-FFF2-40B4-BE49-F238E27FC236}">
+                <a16:creationId xmlns:a16="http://schemas.microsoft.com/office/drawing/2014/main" id="{BC55F644-6AE8-2703-BEF6-B6F1AEAB70A9}"/>
+              </a:ext>
+            </a:extLst>
+          </p:cNvPr>
+          <p:cNvSpPr/>
+          <p:nvPr/>
+        </p:nvSpPr>
+        <p:spPr>
+          <a:xfrm>
+            <a:off x="6174463" y="1742791"/>
+            <a:ext cx="2417276" cy="2648139"/>
+          </a:xfrm>
+          <a:prstGeom prst="rect">
+            <a:avLst/>
+          </a:prstGeom>
+          <a:solidFill>
+            <a:srgbClr val="92D050">
+              <a:alpha val="20000"/>
+            </a:srgbClr>
+          </a:solidFill>
+          <a:ln>
+            <a:noFill/>
+          </a:ln>
+        </p:spPr>
+        <p:style>
+          <a:lnRef idx="2">
+            <a:schemeClr val="accent1">
+              <a:shade val="15000"/>
+            </a:schemeClr>
+          </a:lnRef>
+          <a:fillRef idx="1">
+            <a:schemeClr val="accent1"/>
+          </a:fillRef>
+          <a:effectRef idx="0">
+            <a:schemeClr val="accent1"/>
+          </a:effectRef>
+          <a:fontRef idx="minor">
+            <a:schemeClr val="lt1"/>
+          </a:fontRef>
+        </p:style>
+        <p:txBody>
+          <a:bodyPr rtlCol="0" anchor="ctr"/>
+          <a:lstStyle/>
+          <a:p>
+            <a:pPr algn="ctr"/>
+            <a:endParaRPr lang="en-SE"/>
+          </a:p>
+        </p:txBody>
+      </p:sp>
+    </p:spTree>
+    <p:extLst>
+      <p:ext uri="{BB962C8B-B14F-4D97-AF65-F5344CB8AC3E}">
+        <p14:creationId xmlns:p14="http://schemas.microsoft.com/office/powerpoint/2010/main" val="191246546"/>
+      </p:ext>
+    </p:extLst>
+  </p:cSld>
+  <p:clrMapOvr>
+    <a:masterClrMapping/>
+  </p:clrMapOvr>
+</p:sld>
+</file>
+
+<file path=ppt/slides/slide6.xml><?xml version="1.0" encoding="utf-8"?>
+<p:sld xmlns:a="http://schemas.openxmlformats.org/drawingml/2006/main" xmlns:r="http://schemas.openxmlformats.org/officeDocument/2006/relationships" xmlns:p="http://schemas.openxmlformats.org/presentationml/2006/main">
+  <p:cSld>
+    <p:spTree>
+      <p:nvGrpSpPr>
+        <p:cNvPr id="1" name="">
+          <a:extLst>
+            <a:ext uri="{FF2B5EF4-FFF2-40B4-BE49-F238E27FC236}">
+              <a16:creationId xmlns:a16="http://schemas.microsoft.com/office/drawing/2014/main" id="{5B98D364-0DA5-3FDC-21B2-E0DA0777444C}"/>
+            </a:ext>
+          </a:extLst>
+        </p:cNvPr>
+        <p:cNvGrpSpPr/>
+        <p:nvPr/>
+      </p:nvGrpSpPr>
+      <p:grpSpPr>
+        <a:xfrm>
+          <a:off x="0" y="0"/>
+          <a:ext cx="0" cy="0"/>
+          <a:chOff x="0" y="0"/>
+          <a:chExt cx="0" cy="0"/>
+        </a:xfrm>
+      </p:grpSpPr>
+      <p:pic>
+        <p:nvPicPr>
+          <p:cNvPr id="5" name="Picture 4">
+            <a:extLst>
+              <a:ext uri="{FF2B5EF4-FFF2-40B4-BE49-F238E27FC236}">
+                <a16:creationId xmlns:a16="http://schemas.microsoft.com/office/drawing/2014/main" id="{0CFA1C36-61A5-7B35-BE24-9EF189C879EA}"/>
+              </a:ext>
+            </a:extLst>
+          </p:cNvPr>
+          <p:cNvPicPr>
+            <a:picLocks noChangeAspect="1"/>
+          </p:cNvPicPr>
+          <p:nvPr/>
+        </p:nvPicPr>
+        <p:blipFill>
+          <a:blip r:embed="rId2">
+            <a:extLst>
+              <a:ext uri="{28A0092B-C50C-407E-A947-70E740481C1C}">
+                <a14:useLocalDpi xmlns:a14="http://schemas.microsoft.com/office/drawing/2010/main" val="0"/>
+              </a:ext>
+            </a:extLst>
+          </a:blip>
+          <a:stretch>
+            <a:fillRect/>
+          </a:stretch>
+        </p:blipFill>
+        <p:spPr>
+          <a:xfrm>
+            <a:off x="819801" y="363450"/>
+            <a:ext cx="10552398" cy="6131099"/>
+          </a:xfrm>
+          <a:prstGeom prst="rect">
+            <a:avLst/>
+          </a:prstGeom>
+        </p:spPr>
+      </p:pic>
+      <p:sp>
+        <p:nvSpPr>
+          <p:cNvPr id="4" name="Rectangle 3">
+            <a:extLst>
+              <a:ext uri="{FF2B5EF4-FFF2-40B4-BE49-F238E27FC236}">
+                <a16:creationId xmlns:a16="http://schemas.microsoft.com/office/drawing/2014/main" id="{DF0ACF74-334C-FB77-3402-C9E567E382F2}"/>
+              </a:ext>
+            </a:extLst>
+          </p:cNvPr>
+          <p:cNvSpPr/>
+          <p:nvPr/>
+        </p:nvSpPr>
+        <p:spPr>
+          <a:xfrm>
+            <a:off x="3023857" y="1742792"/>
+            <a:ext cx="2525918" cy="1358019"/>
+          </a:xfrm>
+          <a:prstGeom prst="rect">
+            <a:avLst/>
+          </a:prstGeom>
+          <a:solidFill>
+            <a:srgbClr val="FFFF00">
+              <a:alpha val="20000"/>
+            </a:srgbClr>
+          </a:solidFill>
+          <a:ln>
+            <a:noFill/>
+          </a:ln>
+        </p:spPr>
+        <p:style>
+          <a:lnRef idx="2">
+            <a:schemeClr val="accent1">
+              <a:shade val="15000"/>
+            </a:schemeClr>
+          </a:lnRef>
+          <a:fillRef idx="1">
+            <a:schemeClr val="accent1"/>
+          </a:fillRef>
+          <a:effectRef idx="0">
+            <a:schemeClr val="accent1"/>
+          </a:effectRef>
+          <a:fontRef idx="minor">
+            <a:schemeClr val="lt1"/>
+          </a:fontRef>
+        </p:style>
+        <p:txBody>
+          <a:bodyPr rtlCol="0" anchor="ctr"/>
+          <a:lstStyle/>
+          <a:p>
+            <a:pPr algn="ctr"/>
+            <a:endParaRPr lang="en-SE"/>
+          </a:p>
+        </p:txBody>
+      </p:sp>
+    </p:spTree>
+    <p:extLst>
+      <p:ext uri="{BB962C8B-B14F-4D97-AF65-F5344CB8AC3E}">
+        <p14:creationId xmlns:p14="http://schemas.microsoft.com/office/powerpoint/2010/main" val="1393424185"/>
+      </p:ext>
+    </p:extLst>
+  </p:cSld>
+  <p:clrMapOvr>
+    <a:masterClrMapping/>
+  </p:clrMapOvr>
+</p:sld>
+</file>
+
+<file path=ppt/slides/slide7.xml><?xml version="1.0" encoding="utf-8"?>
+<p:sld xmlns:a="http://schemas.openxmlformats.org/drawingml/2006/main" xmlns:r="http://schemas.openxmlformats.org/officeDocument/2006/relationships" xmlns:p="http://schemas.openxmlformats.org/presentationml/2006/main">
+  <p:cSld>
+    <p:spTree>
+      <p:nvGrpSpPr>
+        <p:cNvPr id="1" name=""/>
+        <p:cNvGrpSpPr/>
+        <p:nvPr/>
+      </p:nvGrpSpPr>
+      <p:grpSpPr>
+        <a:xfrm>
+          <a:off x="0" y="0"/>
+          <a:ext cx="0" cy="0"/>
+          <a:chOff x="0" y="0"/>
+          <a:chExt cx="0" cy="0"/>
+        </a:xfrm>
+      </p:grpSpPr>
+      <p:pic>
+        <p:nvPicPr>
+          <p:cNvPr id="3" name="Picture 2">
+            <a:extLst>
+              <a:ext uri="{FF2B5EF4-FFF2-40B4-BE49-F238E27FC236}">
+                <a16:creationId xmlns:a16="http://schemas.microsoft.com/office/drawing/2014/main" id="{DC1C9F4A-FFD5-0939-AF4E-5986361FAE25}"/>
+              </a:ext>
+            </a:extLst>
+          </p:cNvPr>
+          <p:cNvPicPr>
+            <a:picLocks noChangeAspect="1"/>
+          </p:cNvPicPr>
+          <p:nvPr/>
+        </p:nvPicPr>
+        <p:blipFill>
+          <a:blip r:embed="rId2">
+            <a:extLst>
+              <a:ext uri="{28A0092B-C50C-407E-A947-70E740481C1C}">
+                <a14:useLocalDpi xmlns:a14="http://schemas.microsoft.com/office/drawing/2010/main" val="0"/>
+              </a:ext>
+            </a:extLst>
+          </a:blip>
+          <a:stretch>
+            <a:fillRect/>
+          </a:stretch>
+        </p:blipFill>
+        <p:spPr>
+          <a:xfrm>
+            <a:off x="1544375" y="270653"/>
+            <a:ext cx="9103250" cy="6316694"/>
+          </a:xfrm>
+          <a:prstGeom prst="rect">
+            <a:avLst/>
+          </a:prstGeom>
+        </p:spPr>
+      </p:pic>
+    </p:spTree>
+    <p:extLst>
+      <p:ext uri="{BB962C8B-B14F-4D97-AF65-F5344CB8AC3E}">
+        <p14:creationId xmlns:p14="http://schemas.microsoft.com/office/powerpoint/2010/main" val="914108623"/>
       </p:ext>
     </p:extLst>
   </p:cSld>

</xml_diff>

<commit_message>
corrected placement of png in first slide
</commit_message>
<xml_diff>
--- a/yh_labb/presentation.pptx
+++ b/yh_labb/presentation.pptx
@@ -5,8 +5,8 @@
     <p:sldMasterId id="2147483648" r:id="rId1"/>
   </p:sldMasterIdLst>
   <p:sldIdLst>
-    <p:sldId id="256" r:id="rId2"/>
-    <p:sldId id="258" r:id="rId3"/>
+    <p:sldId id="258" r:id="rId2"/>
+    <p:sldId id="263" r:id="rId3"/>
     <p:sldId id="261" r:id="rId4"/>
     <p:sldId id="262" r:id="rId5"/>
     <p:sldId id="259" r:id="rId6"/>
@@ -3336,72 +3336,6 @@
   <p:cSld>
     <p:spTree>
       <p:nvGrpSpPr>
-        <p:cNvPr id="1" name=""/>
-        <p:cNvGrpSpPr/>
-        <p:nvPr/>
-      </p:nvGrpSpPr>
-      <p:grpSpPr>
-        <a:xfrm>
-          <a:off x="0" y="0"/>
-          <a:ext cx="0" cy="0"/>
-          <a:chOff x="0" y="0"/>
-          <a:chExt cx="0" cy="0"/>
-        </a:xfrm>
-      </p:grpSpPr>
-      <p:pic>
-        <p:nvPicPr>
-          <p:cNvPr id="5" name="Picture 4">
-            <a:extLst>
-              <a:ext uri="{FF2B5EF4-FFF2-40B4-BE49-F238E27FC236}">
-                <a16:creationId xmlns:a16="http://schemas.microsoft.com/office/drawing/2014/main" id="{018AE1FC-3C78-1E43-FD7F-675EAC778DD6}"/>
-              </a:ext>
-            </a:extLst>
-          </p:cNvPr>
-          <p:cNvPicPr>
-            <a:picLocks noChangeAspect="1"/>
-          </p:cNvPicPr>
-          <p:nvPr/>
-        </p:nvPicPr>
-        <p:blipFill>
-          <a:blip r:embed="rId2">
-            <a:extLst>
-              <a:ext uri="{28A0092B-C50C-407E-A947-70E740481C1C}">
-                <a14:useLocalDpi xmlns:a14="http://schemas.microsoft.com/office/drawing/2010/main" val="0"/>
-              </a:ext>
-            </a:extLst>
-          </a:blip>
-          <a:stretch>
-            <a:fillRect/>
-          </a:stretch>
-        </p:blipFill>
-        <p:spPr>
-          <a:xfrm>
-            <a:off x="433913" y="139244"/>
-            <a:ext cx="11324174" cy="6579512"/>
-          </a:xfrm>
-          <a:prstGeom prst="rect">
-            <a:avLst/>
-          </a:prstGeom>
-        </p:spPr>
-      </p:pic>
-    </p:spTree>
-    <p:extLst>
-      <p:ext uri="{BB962C8B-B14F-4D97-AF65-F5344CB8AC3E}">
-        <p14:creationId xmlns:p14="http://schemas.microsoft.com/office/powerpoint/2010/main" val="805517552"/>
-      </p:ext>
-    </p:extLst>
-  </p:cSld>
-  <p:clrMapOvr>
-    <a:masterClrMapping/>
-  </p:clrMapOvr>
-</p:sld>
-</file>
-
-<file path=ppt/slides/slide2.xml><?xml version="1.0" encoding="utf-8"?>
-<p:sld xmlns:a="http://schemas.openxmlformats.org/drawingml/2006/main" xmlns:r="http://schemas.openxmlformats.org/officeDocument/2006/relationships" xmlns:p="http://schemas.openxmlformats.org/presentationml/2006/main">
-  <p:cSld>
-    <p:spTree>
-      <p:nvGrpSpPr>
         <p:cNvPr id="1" name="">
           <a:extLst>
             <a:ext uri="{FF2B5EF4-FFF2-40B4-BE49-F238E27FC236}">
@@ -3456,12 +3390,84 @@
           </a:prstGeom>
         </p:spPr>
       </p:pic>
+    </p:spTree>
+    <p:extLst>
+      <p:ext uri="{BB962C8B-B14F-4D97-AF65-F5344CB8AC3E}">
+        <p14:creationId xmlns:p14="http://schemas.microsoft.com/office/powerpoint/2010/main" val="1610387243"/>
+      </p:ext>
+    </p:extLst>
+  </p:cSld>
+  <p:clrMapOvr>
+    <a:masterClrMapping/>
+  </p:clrMapOvr>
+</p:sld>
+</file>
+
+<file path=ppt/slides/slide2.xml><?xml version="1.0" encoding="utf-8"?>
+<p:sld xmlns:a="http://schemas.openxmlformats.org/drawingml/2006/main" xmlns:r="http://schemas.openxmlformats.org/officeDocument/2006/relationships" xmlns:p="http://schemas.openxmlformats.org/presentationml/2006/main">
+  <p:cSld>
+    <p:spTree>
+      <p:nvGrpSpPr>
+        <p:cNvPr id="1" name="">
+          <a:extLst>
+            <a:ext uri="{FF2B5EF4-FFF2-40B4-BE49-F238E27FC236}">
+              <a16:creationId xmlns:a16="http://schemas.microsoft.com/office/drawing/2014/main" id="{028A65DE-5BC8-B512-69ED-09CB807D1DB6}"/>
+            </a:ext>
+          </a:extLst>
+        </p:cNvPr>
+        <p:cNvGrpSpPr/>
+        <p:nvPr/>
+      </p:nvGrpSpPr>
+      <p:grpSpPr>
+        <a:xfrm>
+          <a:off x="0" y="0"/>
+          <a:ext cx="0" cy="0"/>
+          <a:chOff x="0" y="0"/>
+          <a:chExt cx="0" cy="0"/>
+        </a:xfrm>
+      </p:grpSpPr>
+      <p:pic>
+        <p:nvPicPr>
+          <p:cNvPr id="5" name="Picture 4">
+            <a:extLst>
+              <a:ext uri="{FF2B5EF4-FFF2-40B4-BE49-F238E27FC236}">
+                <a16:creationId xmlns:a16="http://schemas.microsoft.com/office/drawing/2014/main" id="{568A681B-B56E-2D87-3415-8EEB27082DBB}"/>
+              </a:ext>
+            </a:extLst>
+          </p:cNvPr>
+          <p:cNvPicPr>
+            <a:picLocks noChangeAspect="1"/>
+          </p:cNvPicPr>
+          <p:nvPr/>
+        </p:nvPicPr>
+        <p:blipFill>
+          <a:blip r:embed="rId2">
+            <a:extLst>
+              <a:ext uri="{28A0092B-C50C-407E-A947-70E740481C1C}">
+                <a14:useLocalDpi xmlns:a14="http://schemas.microsoft.com/office/drawing/2010/main" val="0"/>
+              </a:ext>
+            </a:extLst>
+          </a:blip>
+          <a:stretch>
+            <a:fillRect/>
+          </a:stretch>
+        </p:blipFill>
+        <p:spPr>
+          <a:xfrm>
+            <a:off x="819801" y="363450"/>
+            <a:ext cx="10552398" cy="6131099"/>
+          </a:xfrm>
+          <a:prstGeom prst="rect">
+            <a:avLst/>
+          </a:prstGeom>
+        </p:spPr>
+      </p:pic>
       <p:sp>
         <p:nvSpPr>
           <p:cNvPr id="2" name="L-Shape 1">
             <a:extLst>
               <a:ext uri="{FF2B5EF4-FFF2-40B4-BE49-F238E27FC236}">
-                <a16:creationId xmlns:a16="http://schemas.microsoft.com/office/drawing/2014/main" id="{022B0DA5-FCA0-F769-1239-1B02BA9ECA1F}"/>
+                <a16:creationId xmlns:a16="http://schemas.microsoft.com/office/drawing/2014/main" id="{D1612231-9D2F-D47F-1BE9-5C2E708134D4}"/>
               </a:ext>
             </a:extLst>
           </p:cNvPr>
@@ -3518,7 +3524,7 @@
           <p:cNvPr id="3" name="Rectangle 2">
             <a:extLst>
               <a:ext uri="{FF2B5EF4-FFF2-40B4-BE49-F238E27FC236}">
-                <a16:creationId xmlns:a16="http://schemas.microsoft.com/office/drawing/2014/main" id="{870F02AF-0C65-E7B0-3792-722F72E0B32E}"/>
+                <a16:creationId xmlns:a16="http://schemas.microsoft.com/office/drawing/2014/main" id="{9D5C7898-C690-E195-58BE-DB856291107C}"/>
               </a:ext>
             </a:extLst>
           </p:cNvPr>
@@ -3572,7 +3578,7 @@
           <p:cNvPr id="4" name="Rectangle 3">
             <a:extLst>
               <a:ext uri="{FF2B5EF4-FFF2-40B4-BE49-F238E27FC236}">
-                <a16:creationId xmlns:a16="http://schemas.microsoft.com/office/drawing/2014/main" id="{BE702F69-04B4-368C-798F-6A297C18C45D}"/>
+                <a16:creationId xmlns:a16="http://schemas.microsoft.com/office/drawing/2014/main" id="{3A40372B-BDCF-122C-0A05-DF30737445BB}"/>
               </a:ext>
             </a:extLst>
           </p:cNvPr>
@@ -3626,7 +3632,7 @@
           <p:cNvPr id="11" name="Rectangle 10">
             <a:extLst>
               <a:ext uri="{FF2B5EF4-FFF2-40B4-BE49-F238E27FC236}">
-                <a16:creationId xmlns:a16="http://schemas.microsoft.com/office/drawing/2014/main" id="{B0A32505-1454-6498-9F11-4E88A2DBEECB}"/>
+                <a16:creationId xmlns:a16="http://schemas.microsoft.com/office/drawing/2014/main" id="{72B009C0-8C74-067D-BDD2-346C219E4587}"/>
               </a:ext>
             </a:extLst>
           </p:cNvPr>
@@ -3680,7 +3686,7 @@
           <p:cNvPr id="12" name="Rectangle 11">
             <a:extLst>
               <a:ext uri="{FF2B5EF4-FFF2-40B4-BE49-F238E27FC236}">
-                <a16:creationId xmlns:a16="http://schemas.microsoft.com/office/drawing/2014/main" id="{1BC504B3-409C-94B3-A24D-AFF92128A1B5}"/>
+                <a16:creationId xmlns:a16="http://schemas.microsoft.com/office/drawing/2014/main" id="{6095ED5B-90CD-6AAF-197C-87EB6846B435}"/>
               </a:ext>
             </a:extLst>
           </p:cNvPr>
@@ -3732,7 +3738,7 @@
     </p:spTree>
     <p:extLst>
       <p:ext uri="{BB962C8B-B14F-4D97-AF65-F5344CB8AC3E}">
-        <p14:creationId xmlns:p14="http://schemas.microsoft.com/office/powerpoint/2010/main" val="1610387243"/>
+        <p14:creationId xmlns:p14="http://schemas.microsoft.com/office/powerpoint/2010/main" val="3859052140"/>
       </p:ext>
     </p:extLst>
   </p:cSld>

</xml_diff>

<commit_message>
Added color coding to logical model as well
</commit_message>
<xml_diff>
--- a/yh_labb/presentation.pptx
+++ b/yh_labb/presentation.pptx
@@ -12,6 +12,7 @@
     <p:sldId id="259" r:id="rId6"/>
     <p:sldId id="260" r:id="rId7"/>
     <p:sldId id="257" r:id="rId8"/>
+    <p:sldId id="264" r:id="rId9"/>
   </p:sldIdLst>
   <p:sldSz cx="12192000" cy="6858000"/>
   <p:notesSz cx="6858000" cy="9144000"/>
@@ -110,6 +111,11 @@
       </a:defRPr>
     </a:lvl9pPr>
   </p:defaultTextStyle>
+  <p:extLst>
+    <p:ext uri="{EFAFB233-063F-42B5-8137-9DF3F51BA10A}">
+      <p15:sldGuideLst xmlns:p15="http://schemas.microsoft.com/office/powerpoint/2012/main"/>
+    </p:ext>
+  </p:extLst>
 </p:presentation>
 </file>
 
@@ -262,7 +268,7 @@
           <a:p>
             <a:fld id="{7A98FA03-1A3B-45A1-AF81-10310EEDDF7C}" type="datetimeFigureOut">
               <a:rPr lang="en-SE" smtClean="0"/>
-              <a:t>2026-02-13</a:t>
+              <a:t>2026-02-16</a:t>
             </a:fld>
             <a:endParaRPr lang="en-SE"/>
           </a:p>
@@ -462,7 +468,7 @@
           <a:p>
             <a:fld id="{7A98FA03-1A3B-45A1-AF81-10310EEDDF7C}" type="datetimeFigureOut">
               <a:rPr lang="en-SE" smtClean="0"/>
-              <a:t>2026-02-13</a:t>
+              <a:t>2026-02-16</a:t>
             </a:fld>
             <a:endParaRPr lang="en-SE"/>
           </a:p>
@@ -672,7 +678,7 @@
           <a:p>
             <a:fld id="{7A98FA03-1A3B-45A1-AF81-10310EEDDF7C}" type="datetimeFigureOut">
               <a:rPr lang="en-SE" smtClean="0"/>
-              <a:t>2026-02-13</a:t>
+              <a:t>2026-02-16</a:t>
             </a:fld>
             <a:endParaRPr lang="en-SE"/>
           </a:p>
@@ -872,7 +878,7 @@
           <a:p>
             <a:fld id="{7A98FA03-1A3B-45A1-AF81-10310EEDDF7C}" type="datetimeFigureOut">
               <a:rPr lang="en-SE" smtClean="0"/>
-              <a:t>2026-02-13</a:t>
+              <a:t>2026-02-16</a:t>
             </a:fld>
             <a:endParaRPr lang="en-SE"/>
           </a:p>
@@ -1148,7 +1154,7 @@
           <a:p>
             <a:fld id="{7A98FA03-1A3B-45A1-AF81-10310EEDDF7C}" type="datetimeFigureOut">
               <a:rPr lang="en-SE" smtClean="0"/>
-              <a:t>2026-02-13</a:t>
+              <a:t>2026-02-16</a:t>
             </a:fld>
             <a:endParaRPr lang="en-SE"/>
           </a:p>
@@ -1416,7 +1422,7 @@
           <a:p>
             <a:fld id="{7A98FA03-1A3B-45A1-AF81-10310EEDDF7C}" type="datetimeFigureOut">
               <a:rPr lang="en-SE" smtClean="0"/>
-              <a:t>2026-02-13</a:t>
+              <a:t>2026-02-16</a:t>
             </a:fld>
             <a:endParaRPr lang="en-SE"/>
           </a:p>
@@ -1831,7 +1837,7 @@
           <a:p>
             <a:fld id="{7A98FA03-1A3B-45A1-AF81-10310EEDDF7C}" type="datetimeFigureOut">
               <a:rPr lang="en-SE" smtClean="0"/>
-              <a:t>2026-02-13</a:t>
+              <a:t>2026-02-16</a:t>
             </a:fld>
             <a:endParaRPr lang="en-SE"/>
           </a:p>
@@ -1973,7 +1979,7 @@
           <a:p>
             <a:fld id="{7A98FA03-1A3B-45A1-AF81-10310EEDDF7C}" type="datetimeFigureOut">
               <a:rPr lang="en-SE" smtClean="0"/>
-              <a:t>2026-02-13</a:t>
+              <a:t>2026-02-16</a:t>
             </a:fld>
             <a:endParaRPr lang="en-SE"/>
           </a:p>
@@ -2086,7 +2092,7 @@
           <a:p>
             <a:fld id="{7A98FA03-1A3B-45A1-AF81-10310EEDDF7C}" type="datetimeFigureOut">
               <a:rPr lang="en-SE" smtClean="0"/>
-              <a:t>2026-02-13</a:t>
+              <a:t>2026-02-16</a:t>
             </a:fld>
             <a:endParaRPr lang="en-SE"/>
           </a:p>
@@ -2399,7 +2405,7 @@
           <a:p>
             <a:fld id="{7A98FA03-1A3B-45A1-AF81-10310EEDDF7C}" type="datetimeFigureOut">
               <a:rPr lang="en-SE" smtClean="0"/>
-              <a:t>2026-02-13</a:t>
+              <a:t>2026-02-16</a:t>
             </a:fld>
             <a:endParaRPr lang="en-SE"/>
           </a:p>
@@ -2688,7 +2694,7 @@
           <a:p>
             <a:fld id="{7A98FA03-1A3B-45A1-AF81-10310EEDDF7C}" type="datetimeFigureOut">
               <a:rPr lang="en-SE" smtClean="0"/>
-              <a:t>2026-02-13</a:t>
+              <a:t>2026-02-16</a:t>
             </a:fld>
             <a:endParaRPr lang="en-SE"/>
           </a:p>
@@ -2931,7 +2937,7 @@
           <a:p>
             <a:fld id="{7A98FA03-1A3B-45A1-AF81-10310EEDDF7C}" type="datetimeFigureOut">
               <a:rPr lang="en-SE" smtClean="0"/>
-              <a:t>2026-02-13</a:t>
+              <a:t>2026-02-16</a:t>
             </a:fld>
             <a:endParaRPr lang="en-SE"/>
           </a:p>
@@ -4375,6 +4381,402 @@
 </p:sld>
 </file>
 
+<file path=ppt/slides/slide8.xml><?xml version="1.0" encoding="utf-8"?>
+<p:sld xmlns:a="http://schemas.openxmlformats.org/drawingml/2006/main" xmlns:r="http://schemas.openxmlformats.org/officeDocument/2006/relationships" xmlns:p="http://schemas.openxmlformats.org/presentationml/2006/main">
+  <p:cSld>
+    <p:spTree>
+      <p:nvGrpSpPr>
+        <p:cNvPr id="1" name="">
+          <a:extLst>
+            <a:ext uri="{FF2B5EF4-FFF2-40B4-BE49-F238E27FC236}">
+              <a16:creationId xmlns:a16="http://schemas.microsoft.com/office/drawing/2014/main" id="{4ADB4952-2BB2-6CE4-9DD3-91CA121023E3}"/>
+            </a:ext>
+          </a:extLst>
+        </p:cNvPr>
+        <p:cNvGrpSpPr/>
+        <p:nvPr/>
+      </p:nvGrpSpPr>
+      <p:grpSpPr>
+        <a:xfrm>
+          <a:off x="0" y="0"/>
+          <a:ext cx="0" cy="0"/>
+          <a:chOff x="0" y="0"/>
+          <a:chExt cx="0" cy="0"/>
+        </a:xfrm>
+      </p:grpSpPr>
+      <p:pic>
+        <p:nvPicPr>
+          <p:cNvPr id="3" name="Picture 2">
+            <a:extLst>
+              <a:ext uri="{FF2B5EF4-FFF2-40B4-BE49-F238E27FC236}">
+                <a16:creationId xmlns:a16="http://schemas.microsoft.com/office/drawing/2014/main" id="{880262B1-4F7B-6A90-73CA-AD80D0D0C2D8}"/>
+              </a:ext>
+            </a:extLst>
+          </p:cNvPr>
+          <p:cNvPicPr>
+            <a:picLocks noChangeAspect="1"/>
+          </p:cNvPicPr>
+          <p:nvPr/>
+        </p:nvPicPr>
+        <p:blipFill>
+          <a:blip r:embed="rId2">
+            <a:extLst>
+              <a:ext uri="{28A0092B-C50C-407E-A947-70E740481C1C}">
+                <a14:useLocalDpi xmlns:a14="http://schemas.microsoft.com/office/drawing/2010/main" val="0"/>
+              </a:ext>
+            </a:extLst>
+          </a:blip>
+          <a:stretch>
+            <a:fillRect/>
+          </a:stretch>
+        </p:blipFill>
+        <p:spPr>
+          <a:xfrm>
+            <a:off x="1544375" y="270653"/>
+            <a:ext cx="9103250" cy="6316694"/>
+          </a:xfrm>
+          <a:prstGeom prst="rect">
+            <a:avLst/>
+          </a:prstGeom>
+        </p:spPr>
+      </p:pic>
+      <p:sp>
+        <p:nvSpPr>
+          <p:cNvPr id="2" name="Rectangle 1">
+            <a:extLst>
+              <a:ext uri="{FF2B5EF4-FFF2-40B4-BE49-F238E27FC236}">
+                <a16:creationId xmlns:a16="http://schemas.microsoft.com/office/drawing/2014/main" id="{8AFFC17E-09FA-F3D4-725D-45949A0874DB}"/>
+              </a:ext>
+            </a:extLst>
+          </p:cNvPr>
+          <p:cNvSpPr/>
+          <p:nvPr/>
+        </p:nvSpPr>
+        <p:spPr>
+          <a:xfrm>
+            <a:off x="1439501" y="172017"/>
+            <a:ext cx="4209861" cy="2100404"/>
+          </a:xfrm>
+          <a:prstGeom prst="rect">
+            <a:avLst/>
+          </a:prstGeom>
+          <a:solidFill>
+            <a:srgbClr val="CC00FF">
+              <a:alpha val="20000"/>
+            </a:srgbClr>
+          </a:solidFill>
+          <a:ln>
+            <a:noFill/>
+          </a:ln>
+        </p:spPr>
+        <p:style>
+          <a:lnRef idx="2">
+            <a:schemeClr val="accent1">
+              <a:shade val="15000"/>
+            </a:schemeClr>
+          </a:lnRef>
+          <a:fillRef idx="1">
+            <a:schemeClr val="accent1"/>
+          </a:fillRef>
+          <a:effectRef idx="0">
+            <a:schemeClr val="accent1"/>
+          </a:effectRef>
+          <a:fontRef idx="minor">
+            <a:schemeClr val="lt1"/>
+          </a:fontRef>
+        </p:style>
+        <p:txBody>
+          <a:bodyPr rtlCol="0" anchor="ctr"/>
+          <a:lstStyle/>
+          <a:p>
+            <a:pPr algn="ctr"/>
+            <a:endParaRPr lang="en-SE"/>
+          </a:p>
+        </p:txBody>
+      </p:sp>
+      <p:sp>
+        <p:nvSpPr>
+          <p:cNvPr id="5" name="Rectangle 4">
+            <a:extLst>
+              <a:ext uri="{FF2B5EF4-FFF2-40B4-BE49-F238E27FC236}">
+                <a16:creationId xmlns:a16="http://schemas.microsoft.com/office/drawing/2014/main" id="{84DD70FF-1C99-7CD3-D1D8-35BFFA58DA3E}"/>
+              </a:ext>
+            </a:extLst>
+          </p:cNvPr>
+          <p:cNvSpPr/>
+          <p:nvPr/>
+        </p:nvSpPr>
+        <p:spPr>
+          <a:xfrm>
+            <a:off x="6167527" y="1937442"/>
+            <a:ext cx="1881004" cy="4463358"/>
+          </a:xfrm>
+          <a:prstGeom prst="rect">
+            <a:avLst/>
+          </a:prstGeom>
+          <a:solidFill>
+            <a:srgbClr val="92D050">
+              <a:alpha val="20000"/>
+            </a:srgbClr>
+          </a:solidFill>
+          <a:ln>
+            <a:noFill/>
+          </a:ln>
+        </p:spPr>
+        <p:style>
+          <a:lnRef idx="2">
+            <a:schemeClr val="accent1">
+              <a:shade val="15000"/>
+            </a:schemeClr>
+          </a:lnRef>
+          <a:fillRef idx="1">
+            <a:schemeClr val="accent1"/>
+          </a:fillRef>
+          <a:effectRef idx="0">
+            <a:schemeClr val="accent1"/>
+          </a:effectRef>
+          <a:fontRef idx="minor">
+            <a:schemeClr val="lt1"/>
+          </a:fontRef>
+        </p:style>
+        <p:txBody>
+          <a:bodyPr rtlCol="0" anchor="ctr"/>
+          <a:lstStyle/>
+          <a:p>
+            <a:pPr algn="ctr"/>
+            <a:endParaRPr lang="en-SE"/>
+          </a:p>
+        </p:txBody>
+      </p:sp>
+      <p:sp>
+        <p:nvSpPr>
+          <p:cNvPr id="6" name="Rectangle 5">
+            <a:extLst>
+              <a:ext uri="{FF2B5EF4-FFF2-40B4-BE49-F238E27FC236}">
+                <a16:creationId xmlns:a16="http://schemas.microsoft.com/office/drawing/2014/main" id="{E79B5A14-2B61-DFE4-2734-00706F37DDBA}"/>
+              </a:ext>
+            </a:extLst>
+          </p:cNvPr>
+          <p:cNvSpPr/>
+          <p:nvPr/>
+        </p:nvSpPr>
+        <p:spPr>
+          <a:xfrm>
+            <a:off x="3766242" y="3847723"/>
+            <a:ext cx="2401283" cy="2553077"/>
+          </a:xfrm>
+          <a:prstGeom prst="rect">
+            <a:avLst/>
+          </a:prstGeom>
+          <a:solidFill>
+            <a:srgbClr val="92D050">
+              <a:alpha val="20000"/>
+            </a:srgbClr>
+          </a:solidFill>
+          <a:ln>
+            <a:noFill/>
+          </a:ln>
+        </p:spPr>
+        <p:style>
+          <a:lnRef idx="2">
+            <a:schemeClr val="accent1">
+              <a:shade val="15000"/>
+            </a:schemeClr>
+          </a:lnRef>
+          <a:fillRef idx="1">
+            <a:schemeClr val="accent1"/>
+          </a:fillRef>
+          <a:effectRef idx="0">
+            <a:schemeClr val="accent1"/>
+          </a:effectRef>
+          <a:fontRef idx="minor">
+            <a:schemeClr val="lt1"/>
+          </a:fontRef>
+        </p:style>
+        <p:txBody>
+          <a:bodyPr rtlCol="0" anchor="ctr"/>
+          <a:lstStyle/>
+          <a:p>
+            <a:pPr algn="ctr"/>
+            <a:endParaRPr lang="en-SE"/>
+          </a:p>
+        </p:txBody>
+      </p:sp>
+      <p:sp>
+        <p:nvSpPr>
+          <p:cNvPr id="7" name="Rectangle 6">
+            <a:extLst>
+              <a:ext uri="{FF2B5EF4-FFF2-40B4-BE49-F238E27FC236}">
+                <a16:creationId xmlns:a16="http://schemas.microsoft.com/office/drawing/2014/main" id="{5D857873-5217-77D9-D2A4-D8044BB4F190}"/>
+              </a:ext>
+            </a:extLst>
+          </p:cNvPr>
+          <p:cNvSpPr/>
+          <p:nvPr/>
+        </p:nvSpPr>
+        <p:spPr>
+          <a:xfrm>
+            <a:off x="8574102" y="1828800"/>
+            <a:ext cx="1881004" cy="4291343"/>
+          </a:xfrm>
+          <a:prstGeom prst="rect">
+            <a:avLst/>
+          </a:prstGeom>
+          <a:solidFill>
+            <a:srgbClr val="0066FF">
+              <a:alpha val="20000"/>
+            </a:srgbClr>
+          </a:solidFill>
+          <a:ln>
+            <a:noFill/>
+          </a:ln>
+        </p:spPr>
+        <p:style>
+          <a:lnRef idx="2">
+            <a:schemeClr val="accent1">
+              <a:shade val="15000"/>
+            </a:schemeClr>
+          </a:lnRef>
+          <a:fillRef idx="1">
+            <a:schemeClr val="accent1"/>
+          </a:fillRef>
+          <a:effectRef idx="0">
+            <a:schemeClr val="accent1"/>
+          </a:effectRef>
+          <a:fontRef idx="minor">
+            <a:schemeClr val="lt1"/>
+          </a:fontRef>
+        </p:style>
+        <p:txBody>
+          <a:bodyPr rtlCol="0" anchor="ctr"/>
+          <a:lstStyle/>
+          <a:p>
+            <a:pPr algn="ctr"/>
+            <a:endParaRPr lang="en-SE"/>
+          </a:p>
+        </p:txBody>
+      </p:sp>
+      <p:sp>
+        <p:nvSpPr>
+          <p:cNvPr id="8" name="Rectangle 7">
+            <a:extLst>
+              <a:ext uri="{FF2B5EF4-FFF2-40B4-BE49-F238E27FC236}">
+                <a16:creationId xmlns:a16="http://schemas.microsoft.com/office/drawing/2014/main" id="{10B7C511-5DEC-15B0-C40C-66BBF5C6272E}"/>
+              </a:ext>
+            </a:extLst>
+          </p:cNvPr>
+          <p:cNvSpPr/>
+          <p:nvPr/>
+        </p:nvSpPr>
+        <p:spPr>
+          <a:xfrm>
+            <a:off x="6167526" y="158991"/>
+            <a:ext cx="4287579" cy="1669809"/>
+          </a:xfrm>
+          <a:prstGeom prst="rect">
+            <a:avLst/>
+          </a:prstGeom>
+          <a:solidFill>
+            <a:srgbClr val="0066FF">
+              <a:alpha val="20000"/>
+            </a:srgbClr>
+          </a:solidFill>
+          <a:ln>
+            <a:noFill/>
+          </a:ln>
+        </p:spPr>
+        <p:style>
+          <a:lnRef idx="2">
+            <a:schemeClr val="accent1">
+              <a:shade val="15000"/>
+            </a:schemeClr>
+          </a:lnRef>
+          <a:fillRef idx="1">
+            <a:schemeClr val="accent1"/>
+          </a:fillRef>
+          <a:effectRef idx="0">
+            <a:schemeClr val="accent1"/>
+          </a:effectRef>
+          <a:fontRef idx="minor">
+            <a:schemeClr val="lt1"/>
+          </a:fontRef>
+        </p:style>
+        <p:txBody>
+          <a:bodyPr rtlCol="0" anchor="ctr"/>
+          <a:lstStyle/>
+          <a:p>
+            <a:pPr algn="ctr"/>
+            <a:endParaRPr lang="en-SE"/>
+          </a:p>
+        </p:txBody>
+      </p:sp>
+      <p:sp>
+        <p:nvSpPr>
+          <p:cNvPr id="9" name="Rectangle 8">
+            <a:extLst>
+              <a:ext uri="{FF2B5EF4-FFF2-40B4-BE49-F238E27FC236}">
+                <a16:creationId xmlns:a16="http://schemas.microsoft.com/office/drawing/2014/main" id="{AD196135-D0F7-EC04-96DE-3C2FD3B502E6}"/>
+              </a:ext>
+            </a:extLst>
+          </p:cNvPr>
+          <p:cNvSpPr/>
+          <p:nvPr/>
+        </p:nvSpPr>
+        <p:spPr>
+          <a:xfrm>
+            <a:off x="3766242" y="2399168"/>
+            <a:ext cx="1883120" cy="1240325"/>
+          </a:xfrm>
+          <a:prstGeom prst="rect">
+            <a:avLst/>
+          </a:prstGeom>
+          <a:solidFill>
+            <a:srgbClr val="FFFF00">
+              <a:alpha val="20000"/>
+            </a:srgbClr>
+          </a:solidFill>
+          <a:ln>
+            <a:noFill/>
+          </a:ln>
+        </p:spPr>
+        <p:style>
+          <a:lnRef idx="2">
+            <a:schemeClr val="accent1">
+              <a:shade val="15000"/>
+            </a:schemeClr>
+          </a:lnRef>
+          <a:fillRef idx="1">
+            <a:schemeClr val="accent1"/>
+          </a:fillRef>
+          <a:effectRef idx="0">
+            <a:schemeClr val="accent1"/>
+          </a:effectRef>
+          <a:fontRef idx="minor">
+            <a:schemeClr val="lt1"/>
+          </a:fontRef>
+        </p:style>
+        <p:txBody>
+          <a:bodyPr rtlCol="0" anchor="ctr"/>
+          <a:lstStyle/>
+          <a:p>
+            <a:pPr algn="ctr"/>
+            <a:endParaRPr lang="en-SE"/>
+          </a:p>
+        </p:txBody>
+      </p:sp>
+    </p:spTree>
+    <p:extLst>
+      <p:ext uri="{BB962C8B-B14F-4D97-AF65-F5344CB8AC3E}">
+        <p14:creationId xmlns:p14="http://schemas.microsoft.com/office/powerpoint/2010/main" val="813188512"/>
+      </p:ext>
+    </p:extLst>
+  </p:cSld>
+  <p:clrMapOvr>
+    <a:masterClrMapping/>
+  </p:clrMapOvr>
+</p:sld>
+</file>
+
 <file path=ppt/theme/theme1.xml><?xml version="1.0" encoding="utf-8"?>
 <a:theme xmlns:a="http://schemas.openxmlformats.org/drawingml/2006/main" name="Office Theme">
   <a:themeElements>

</xml_diff>